<commit_message>
acpt: add scenarios for Picture.auto_shape_type
</commit_message>
<xml_diff>
--- a/features/steps/test_files/shp-picture.pptx
+++ b/features/steps/test_files/shp-picture.pptx
@@ -6,6 +6,7 @@
   </p:sldMasterIdLst>
   <p:sldIdLst>
     <p:sldId id="256" r:id="rId2"/>
+    <p:sldId id="257" r:id="rId3"/>
   </p:sldIdLst>
   <p:sldSz cx="9144000" cy="6858000" type="screen4x3"/>
   <p:notesSz cx="6858000" cy="9144000"/>
@@ -104,6 +105,22 @@
       </a:defRPr>
     </a:lvl9pPr>
   </p:defaultTextStyle>
+  <p:extLst>
+    <p:ext uri="{EFAFB233-063F-42B5-8137-9DF3F51BA10A}">
+      <p15:sldGuideLst xmlns:p15="http://schemas.microsoft.com/office/powerpoint/2012/main">
+        <p15:guide id="1" orient="horz" pos="2160">
+          <p15:clr>
+            <a:srgbClr val="A4A3A4"/>
+          </p15:clr>
+        </p15:guide>
+        <p15:guide id="2" pos="2880">
+          <p15:clr>
+            <a:srgbClr val="A4A3A4"/>
+          </p15:clr>
+        </p15:guide>
+      </p15:sldGuideLst>
+    </p:ext>
+  </p:extLst>
 </p:presentation>
 </file>
 
@@ -491,6 +508,107 @@
     <p:extLst>
       <p:ext uri="{BB962C8B-B14F-4D97-AF65-F5344CB8AC3E}">
         <p14:creationId xmlns:p14="http://schemas.microsoft.com/office/powerpoint/2010/main" val="2656049209"/>
+      </p:ext>
+    </p:extLst>
+  </p:cSld>
+  <p:clrMapOvr>
+    <a:masterClrMapping/>
+  </p:clrMapOvr>
+</p:sld>
+</file>
+
+<file path=ppt/slides/slide2.xml><?xml version="1.0" encoding="utf-8"?>
+<p:sld xmlns:a="http://schemas.openxmlformats.org/drawingml/2006/main" xmlns:r="http://schemas.openxmlformats.org/officeDocument/2006/relationships" xmlns:p="http://schemas.openxmlformats.org/presentationml/2006/main">
+  <p:cSld>
+    <p:spTree>
+      <p:nvGrpSpPr>
+        <p:cNvPr id="1" name=""/>
+        <p:cNvGrpSpPr/>
+        <p:nvPr/>
+      </p:nvGrpSpPr>
+      <p:grpSpPr>
+        <a:xfrm>
+          <a:off x="0" y="0"/>
+          <a:ext cx="0" cy="0"/>
+          <a:chOff x="0" y="0"/>
+          <a:chExt cx="0" cy="0"/>
+        </a:xfrm>
+      </p:grpSpPr>
+      <p:pic>
+        <p:nvPicPr>
+          <p:cNvPr id="3" name="Picture 2">
+            <a:extLst>
+              <a:ext uri="{FF2B5EF4-FFF2-40B4-BE49-F238E27FC236}">
+                <a16:creationId xmlns:a16="http://schemas.microsoft.com/office/drawing/2014/main" id="{3CCCFE27-CDAC-B04F-9550-A044A8791C16}"/>
+              </a:ext>
+            </a:extLst>
+          </p:cNvPr>
+          <p:cNvPicPr>
+            <a:picLocks noChangeAspect="1"/>
+          </p:cNvPicPr>
+          <p:nvPr/>
+        </p:nvPicPr>
+        <p:blipFill>
+          <a:blip r:embed="rId2">
+            <a:extLst>
+              <a:ext uri="{28A0092B-C50C-407E-A947-70E740481C1C}">
+                <a14:useLocalDpi xmlns:a14="http://schemas.microsoft.com/office/drawing/2010/main" val="0"/>
+              </a:ext>
+            </a:extLst>
+          </a:blip>
+          <a:stretch>
+            <a:fillRect/>
+          </a:stretch>
+        </p:blipFill>
+        <p:spPr>
+          <a:xfrm>
+            <a:off x="1780032" y="2072274"/>
+            <a:ext cx="1901952" cy="2713452"/>
+          </a:xfrm>
+          <a:prstGeom prst="rect">
+            <a:avLst/>
+          </a:prstGeom>
+        </p:spPr>
+      </p:pic>
+      <p:pic>
+        <p:nvPicPr>
+          <p:cNvPr id="4" name="Picture 3">
+            <a:extLst>
+              <a:ext uri="{FF2B5EF4-FFF2-40B4-BE49-F238E27FC236}">
+                <a16:creationId xmlns:a16="http://schemas.microsoft.com/office/drawing/2014/main" id="{ED0E2FE1-68F0-4646-8866-82FDFA8B8194}"/>
+              </a:ext>
+            </a:extLst>
+          </p:cNvPr>
+          <p:cNvPicPr>
+            <a:picLocks noChangeAspect="1"/>
+          </p:cNvPicPr>
+          <p:nvPr/>
+        </p:nvPicPr>
+        <p:blipFill rotWithShape="1">
+          <a:blip r:embed="rId2">
+            <a:extLst>
+              <a:ext uri="{28A0092B-C50C-407E-A947-70E740481C1C}">
+                <a14:useLocalDpi xmlns:a14="http://schemas.microsoft.com/office/drawing/2010/main" val="0"/>
+              </a:ext>
+            </a:extLst>
+          </a:blip>
+          <a:srcRect t="15501" r="561" b="14664"/>
+          <a:stretch/>
+        </p:blipFill>
+        <p:spPr>
+          <a:xfrm>
+            <a:off x="5462016" y="2492896"/>
+            <a:ext cx="1891284" cy="1894954"/>
+          </a:xfrm>
+          <a:prstGeom prst="ellipse">
+            <a:avLst/>
+          </a:prstGeom>
+        </p:spPr>
+      </p:pic>
+    </p:spTree>
+    <p:extLst>
+      <p:ext uri="{BB962C8B-B14F-4D97-AF65-F5344CB8AC3E}">
+        <p14:creationId xmlns:p14="http://schemas.microsoft.com/office/powerpoint/2010/main" val="3167905977"/>
       </p:ext>
     </p:extLst>
   </p:cSld>

</xml_diff>